<commit_message>
updated version of slides
</commit_message>
<xml_diff>
--- a/Administration MYSQL.pptx
+++ b/Administration MYSQL.pptx
@@ -6,7 +6,7 @@
     <p:sldMasterId id="2147483650" r:id="rId2"/>
   </p:sldMasterIdLst>
   <p:notesMasterIdLst>
-    <p:notesMasterId r:id="rId48"/>
+    <p:notesMasterId r:id="rId49"/>
   </p:notesMasterIdLst>
   <p:sldIdLst>
     <p:sldId id="256" r:id="rId3"/>
@@ -53,24 +53,25 @@
     <p:sldId id="324" r:id="rId44"/>
     <p:sldId id="325" r:id="rId45"/>
     <p:sldId id="303" r:id="rId46"/>
-    <p:sldId id="317" r:id="rId47"/>
+    <p:sldId id="326" r:id="rId47"/>
+    <p:sldId id="317" r:id="rId48"/>
   </p:sldIdLst>
   <p:sldSz cx="9144000" cy="6858000" type="screen4x3"/>
   <p:notesSz cx="6858000" cy="9144000"/>
   <p:embeddedFontLst>
     <p:embeddedFont>
       <p:font typeface="Calibri" panose="020F0502020204030204" pitchFamily="34" charset="0"/>
-      <p:regular r:id="rId49"/>
-      <p:bold r:id="rId50"/>
-      <p:italic r:id="rId51"/>
-      <p:boldItalic r:id="rId52"/>
+      <p:regular r:id="rId50"/>
+      <p:bold r:id="rId51"/>
+      <p:italic r:id="rId52"/>
+      <p:boldItalic r:id="rId53"/>
     </p:embeddedFont>
     <p:embeddedFont>
       <p:font typeface="Consolas" panose="020B0609020204030204" pitchFamily="49" charset="0"/>
-      <p:regular r:id="rId53"/>
-      <p:bold r:id="rId54"/>
-      <p:italic r:id="rId55"/>
-      <p:boldItalic r:id="rId56"/>
+      <p:regular r:id="rId54"/>
+      <p:bold r:id="rId55"/>
+      <p:italic r:id="rId56"/>
+      <p:boldItalic r:id="rId57"/>
     </p:embeddedFont>
   </p:embeddedFontLst>
   <p:defaultTextStyle>
@@ -323,7 +324,7 @@
       </p15:sldGuideLst>
     </p:ext>
     <p:ext uri="http://customooxmlschemas.google.com/">
-      <go:slidesCustomData xmlns="" xmlns:mc="http://schemas.openxmlformats.org/markup-compatibility/2006" xmlns:mv="urn:schemas-microsoft-com:mac:vml" xmlns:c="http://schemas.openxmlformats.org/drawingml/2006/chart" xmlns:dgm="http://schemas.openxmlformats.org/drawingml/2006/diagram" xmlns:o="urn:schemas-microsoft-com:office:office" xmlns:v="urn:schemas-microsoft-com:vml" xmlns:pvml="urn:schemas-microsoft-com:office:powerpoint" xmlns:com="http://schemas.openxmlformats.org/drawingml/2006/compatibility" xmlns:p14="http://schemas.microsoft.com/office/powerpoint/2010/main" xmlns:p15="http://schemas.microsoft.com/office/powerpoint/2012/main" xmlns:go="http://customooxmlschemas.google.com/" r:id="rId57" roundtripDataSignature="AMtx7mgdwha1DXh13JkAsd7RYtQbsz3FFg=="/>
+      <go:slidesCustomData xmlns="" xmlns:mc="http://schemas.openxmlformats.org/markup-compatibility/2006" xmlns:mv="urn:schemas-microsoft-com:mac:vml" xmlns:c="http://schemas.openxmlformats.org/drawingml/2006/chart" xmlns:dgm="http://schemas.openxmlformats.org/drawingml/2006/diagram" xmlns:o="urn:schemas-microsoft-com:office:office" xmlns:v="urn:schemas-microsoft-com:vml" xmlns:pvml="urn:schemas-microsoft-com:office:powerpoint" xmlns:com="http://schemas.openxmlformats.org/drawingml/2006/compatibility" xmlns:p14="http://schemas.microsoft.com/office/powerpoint/2010/main" xmlns:p15="http://schemas.microsoft.com/office/powerpoint/2012/main" xmlns:go="http://customooxmlschemas.google.com/" r:id="rId58" roundtripDataSignature="AMtx7mgdwha1DXh13JkAsd7RYtQbsz3FFg=="/>
     </p:ext>
   </p:extLst>
 </p:presentation>
@@ -4796,12 +4797,8 @@
               <a:buNone/>
             </a:pPr>
             <a:r>
-              <a:rPr lang="fr-FR"/>
-              <a:t>1062</a:t>
-            </a:r>
-            <a:r>
               <a:rPr lang="fr-FR" dirty="0"/>
-              <a:t>: Duplicate Entry </a:t>
+              <a:t>1062: Duplicate Entry </a:t>
             </a:r>
             <a:endParaRPr dirty="0"/>
           </a:p>
@@ -5838,6 +5835,115 @@
 </file>
 
 <file path=ppt/notesSlides/notesSlide44.xml><?xml version="1.0" encoding="utf-8"?>
+<p:notes xmlns:a="http://schemas.openxmlformats.org/drawingml/2006/main" xmlns:r="http://schemas.openxmlformats.org/officeDocument/2006/relationships" xmlns:p="http://schemas.openxmlformats.org/presentationml/2006/main" showMasterSp="0" showMasterPhAnim="0">
+  <p:cSld>
+    <p:spTree>
+      <p:nvGrpSpPr>
+        <p:cNvPr id="1" name="Shape 55"/>
+        <p:cNvGrpSpPr/>
+        <p:nvPr/>
+      </p:nvGrpSpPr>
+      <p:grpSpPr>
+        <a:xfrm>
+          <a:off x="0" y="0"/>
+          <a:ext cx="0" cy="0"/>
+          <a:chOff x="0" y="0"/>
+          <a:chExt cx="0" cy="0"/>
+        </a:xfrm>
+      </p:grpSpPr>
+      <p:sp>
+        <p:nvSpPr>
+          <p:cNvPr id="56" name="Google Shape;56;p24:notes"/>
+          <p:cNvSpPr txBox="1">
+            <a:spLocks noGrp="1"/>
+          </p:cNvSpPr>
+          <p:nvPr>
+            <p:ph type="body" idx="1"/>
+          </p:nvPr>
+        </p:nvSpPr>
+        <p:spPr>
+          <a:xfrm>
+            <a:off x="685800" y="4343400"/>
+            <a:ext cx="5486400" cy="4114800"/>
+          </a:xfrm>
+          <a:prstGeom prst="rect">
+            <a:avLst/>
+          </a:prstGeom>
+        </p:spPr>
+        <p:txBody>
+          <a:bodyPr spcFirstLastPara="1" wrap="square" lIns="91425" tIns="45700" rIns="91425" bIns="45700" anchor="t" anchorCtr="0">
+            <a:noAutofit/>
+          </a:bodyPr>
+          <a:lstStyle/>
+          <a:p>
+            <a:pPr marL="0" lvl="0" indent="0" algn="l" rtl="0">
+              <a:spcBef>
+                <a:spcPts val="0"/>
+              </a:spcBef>
+              <a:spcAft>
+                <a:spcPts val="0"/>
+              </a:spcAft>
+              <a:buNone/>
+            </a:pPr>
+            <a:endParaRPr dirty="0"/>
+          </a:p>
+        </p:txBody>
+      </p:sp>
+      <p:sp>
+        <p:nvSpPr>
+          <p:cNvPr id="57" name="Google Shape;57;p24:notes"/>
+          <p:cNvSpPr>
+            <a:spLocks noGrp="1" noRot="1" noChangeAspect="1"/>
+          </p:cNvSpPr>
+          <p:nvPr>
+            <p:ph type="sldImg" idx="2"/>
+          </p:nvPr>
+        </p:nvSpPr>
+        <p:spPr>
+          <a:xfrm>
+            <a:off x="1143000" y="685800"/>
+            <a:ext cx="4572000" cy="3429000"/>
+          </a:xfrm>
+          <a:custGeom>
+            <a:avLst/>
+            <a:gdLst/>
+            <a:ahLst/>
+            <a:cxnLst/>
+            <a:rect l="l" t="t" r="r" b="b"/>
+            <a:pathLst>
+              <a:path w="120000" h="120000" extrusionOk="0">
+                <a:moveTo>
+                  <a:pt x="0" y="0"/>
+                </a:moveTo>
+                <a:lnTo>
+                  <a:pt x="120000" y="0"/>
+                </a:lnTo>
+                <a:lnTo>
+                  <a:pt x="120000" y="120000"/>
+                </a:lnTo>
+                <a:lnTo>
+                  <a:pt x="0" y="120000"/>
+                </a:lnTo>
+                <a:close/>
+              </a:path>
+            </a:pathLst>
+          </a:custGeom>
+        </p:spPr>
+      </p:sp>
+    </p:spTree>
+    <p:extLst>
+      <p:ext uri="{BB962C8B-B14F-4D97-AF65-F5344CB8AC3E}">
+        <p14:creationId xmlns:p14="http://schemas.microsoft.com/office/powerpoint/2010/main" val="1416830744"/>
+      </p:ext>
+    </p:extLst>
+  </p:cSld>
+  <p:clrMapOvr>
+    <a:masterClrMapping/>
+  </p:clrMapOvr>
+</p:notes>
+</file>
+
+<file path=ppt/notesSlides/notesSlide45.xml><?xml version="1.0" encoding="utf-8"?>
 <p:notes xmlns:a="http://schemas.openxmlformats.org/drawingml/2006/main" xmlns:r="http://schemas.openxmlformats.org/officeDocument/2006/relationships" xmlns:p="http://schemas.openxmlformats.org/presentationml/2006/main" showMasterSp="0" showMasterPhAnim="0">
   <p:cSld>
     <p:spTree>
@@ -20489,6 +20595,344 @@
 </file>
 
 <file path=ppt/slides/slide45.xml><?xml version="1.0" encoding="utf-8"?>
+<p:sld xmlns:a="http://schemas.openxmlformats.org/drawingml/2006/main" xmlns:r="http://schemas.openxmlformats.org/officeDocument/2006/relationships" xmlns:p="http://schemas.openxmlformats.org/presentationml/2006/main">
+  <p:cSld>
+    <p:spTree>
+      <p:nvGrpSpPr>
+        <p:cNvPr id="1" name="Shape 58"/>
+        <p:cNvGrpSpPr/>
+        <p:nvPr/>
+      </p:nvGrpSpPr>
+      <p:grpSpPr>
+        <a:xfrm>
+          <a:off x="0" y="0"/>
+          <a:ext cx="0" cy="0"/>
+          <a:chOff x="0" y="0"/>
+          <a:chExt cx="0" cy="0"/>
+        </a:xfrm>
+      </p:grpSpPr>
+      <p:sp>
+        <p:nvSpPr>
+          <p:cNvPr id="59" name="Google Shape;59;p24"/>
+          <p:cNvSpPr txBox="1">
+            <a:spLocks noGrp="1"/>
+          </p:cNvSpPr>
+          <p:nvPr>
+            <p:ph type="title"/>
+          </p:nvPr>
+        </p:nvSpPr>
+        <p:spPr>
+          <a:xfrm>
+            <a:off x="0" y="158750"/>
+            <a:ext cx="9096375" cy="473075"/>
+          </a:xfrm>
+          <a:prstGeom prst="rect">
+            <a:avLst/>
+          </a:prstGeom>
+          <a:noFill/>
+          <a:ln>
+            <a:noFill/>
+          </a:ln>
+        </p:spPr>
+        <p:txBody>
+          <a:bodyPr spcFirstLastPara="1" wrap="square" lIns="91425" tIns="45700" rIns="91425" bIns="45700" anchor="ctr" anchorCtr="0">
+            <a:noAutofit/>
+          </a:bodyPr>
+          <a:lstStyle/>
+          <a:p>
+            <a:pPr algn="ctr"/>
+            <a:r>
+              <a:rPr lang="fr-FR" sz="3200" dirty="0"/>
+              <a:t>Liste des journaux </a:t>
+            </a:r>
+            <a:r>
+              <a:rPr lang="fr-FR" sz="3200" dirty="0" err="1"/>
+              <a:t>Mysql</a:t>
+            </a:r>
+            <a:endParaRPr lang="fr-FR" sz="3200" b="1" dirty="0">
+              <a:highlight>
+                <a:srgbClr val="FFFFFF"/>
+              </a:highlight>
+            </a:endParaRPr>
+          </a:p>
+        </p:txBody>
+      </p:sp>
+      <p:sp>
+        <p:nvSpPr>
+          <p:cNvPr id="2" name="Rectangle 1">
+            <a:extLst>
+              <a:ext uri="{FF2B5EF4-FFF2-40B4-BE49-F238E27FC236}">
+                <a16:creationId xmlns:a16="http://schemas.microsoft.com/office/drawing/2014/main" id="{464966F1-D668-4408-B6FA-ADF953C7810D}"/>
+              </a:ext>
+            </a:extLst>
+          </p:cNvPr>
+          <p:cNvSpPr/>
+          <p:nvPr/>
+        </p:nvSpPr>
+        <p:spPr>
+          <a:xfrm>
+            <a:off x="220133" y="1133475"/>
+            <a:ext cx="8703734" cy="5725157"/>
+          </a:xfrm>
+          <a:prstGeom prst="rect">
+            <a:avLst/>
+          </a:prstGeom>
+        </p:spPr>
+        <p:txBody>
+          <a:bodyPr wrap="square">
+            <a:spAutoFit/>
+          </a:bodyPr>
+          <a:lstStyle/>
+          <a:p>
+            <a:pPr marL="342900" indent="-342900">
+              <a:lnSpc>
+                <a:spcPct val="150000"/>
+              </a:lnSpc>
+              <a:buFont typeface="Wingdings" panose="05000000000000000000" pitchFamily="2" charset="2"/>
+              <a:buChar char="§"/>
+            </a:pPr>
+            <a:r>
+              <a:rPr lang="fr-FR" sz="2200" b="1" dirty="0"/>
+              <a:t>General log</a:t>
+            </a:r>
+            <a:r>
+              <a:rPr lang="fr-FR" sz="2200" dirty="0"/>
+              <a:t> - toutes les requêtes - voir VARIABLE </a:t>
+            </a:r>
+            <a:r>
+              <a:rPr lang="fr-FR" sz="2200" dirty="0" err="1"/>
+              <a:t>general_log</a:t>
+            </a:r>
+            <a:endParaRPr lang="fr-FR" sz="2200" dirty="0"/>
+          </a:p>
+          <a:p>
+            <a:pPr marL="342900" indent="-342900">
+              <a:lnSpc>
+                <a:spcPct val="150000"/>
+              </a:lnSpc>
+              <a:buFont typeface="Wingdings" panose="05000000000000000000" pitchFamily="2" charset="2"/>
+              <a:buChar char="§"/>
+            </a:pPr>
+            <a:r>
+              <a:rPr lang="fr-FR" sz="2200" b="1" dirty="0"/>
+              <a:t>Slow log </a:t>
+            </a:r>
+            <a:r>
+              <a:rPr lang="fr-FR" sz="2200" dirty="0"/>
+              <a:t>- requêtes plus lentes que </a:t>
+            </a:r>
+            <a:r>
+              <a:rPr lang="fr-FR" sz="2200" dirty="0" err="1"/>
+              <a:t>long_query_time</a:t>
+            </a:r>
+            <a:r>
+              <a:rPr lang="fr-FR" sz="2200" dirty="0"/>
+              <a:t> - </a:t>
+            </a:r>
+            <a:r>
+              <a:rPr lang="fr-FR" sz="2200" dirty="0" err="1"/>
+              <a:t>slow_query_log_file</a:t>
+            </a:r>
+            <a:endParaRPr lang="fr-FR" sz="2200" dirty="0"/>
+          </a:p>
+          <a:p>
+            <a:pPr marL="342900" indent="-342900">
+              <a:lnSpc>
+                <a:spcPct val="150000"/>
+              </a:lnSpc>
+              <a:buFont typeface="Wingdings" panose="05000000000000000000" pitchFamily="2" charset="2"/>
+              <a:buChar char="§"/>
+            </a:pPr>
+            <a:r>
+              <a:rPr lang="fr-FR" sz="2200" b="1" dirty="0" err="1"/>
+              <a:t>Binlog</a:t>
+            </a:r>
+            <a:r>
+              <a:rPr lang="fr-FR" sz="2200" dirty="0"/>
+              <a:t> - pour réplication et sauvegarde - </a:t>
+            </a:r>
+            <a:r>
+              <a:rPr lang="fr-FR" sz="2200" dirty="0" err="1"/>
+              <a:t>log_bin_basename</a:t>
+            </a:r>
+            <a:endParaRPr lang="fr-FR" sz="2200" dirty="0"/>
+          </a:p>
+          <a:p>
+            <a:pPr marL="342900" indent="-342900">
+              <a:lnSpc>
+                <a:spcPct val="150000"/>
+              </a:lnSpc>
+              <a:buFont typeface="Wingdings" panose="05000000000000000000" pitchFamily="2" charset="2"/>
+              <a:buChar char="§"/>
+            </a:pPr>
+            <a:r>
+              <a:rPr lang="fr-FR" sz="2200" b="1" dirty="0"/>
+              <a:t>Relay log </a:t>
+            </a:r>
+            <a:r>
+              <a:rPr lang="fr-FR" sz="2200" dirty="0"/>
+              <a:t>- également pour la réplication</a:t>
+            </a:r>
+          </a:p>
+          <a:p>
+            <a:pPr marL="342900" indent="-342900">
+              <a:lnSpc>
+                <a:spcPct val="150000"/>
+              </a:lnSpc>
+              <a:buFont typeface="Wingdings" panose="05000000000000000000" pitchFamily="2" charset="2"/>
+              <a:buChar char="§"/>
+            </a:pPr>
+            <a:r>
+              <a:rPr lang="fr-FR" sz="2200" b="1" dirty="0" err="1"/>
+              <a:t>general</a:t>
+            </a:r>
+            <a:r>
+              <a:rPr lang="fr-FR" sz="2200" b="1" dirty="0"/>
+              <a:t> </a:t>
+            </a:r>
+            <a:r>
+              <a:rPr lang="fr-FR" sz="2200" b="1" dirty="0" err="1"/>
+              <a:t>errors</a:t>
+            </a:r>
+            <a:r>
+              <a:rPr lang="fr-FR" sz="2200" b="1" dirty="0"/>
+              <a:t> </a:t>
+            </a:r>
+            <a:r>
+              <a:rPr lang="fr-FR" sz="2200" dirty="0"/>
+              <a:t>- </a:t>
+            </a:r>
+            <a:r>
+              <a:rPr lang="fr-FR" sz="2200" dirty="0" err="1"/>
+              <a:t>mysqld.err</a:t>
+            </a:r>
+            <a:endParaRPr lang="fr-FR" sz="2200" dirty="0"/>
+          </a:p>
+          <a:p>
+            <a:pPr marL="342900" indent="-342900">
+              <a:lnSpc>
+                <a:spcPct val="150000"/>
+              </a:lnSpc>
+              <a:buFont typeface="Wingdings" panose="05000000000000000000" pitchFamily="2" charset="2"/>
+              <a:buChar char="§"/>
+            </a:pPr>
+            <a:r>
+              <a:rPr lang="fr-FR" sz="2200" b="1" dirty="0"/>
+              <a:t>start/stop </a:t>
+            </a:r>
+            <a:r>
+              <a:rPr lang="fr-FR" sz="2200" dirty="0"/>
+              <a:t>- mysql.log (pas très intéressant) - </a:t>
+            </a:r>
+            <a:r>
+              <a:rPr lang="fr-FR" sz="2200" dirty="0" err="1"/>
+              <a:t>log_error</a:t>
+            </a:r>
+            <a:endParaRPr lang="fr-FR" sz="2200" dirty="0"/>
+          </a:p>
+          <a:p>
+            <a:pPr marL="342900" indent="-342900">
+              <a:lnSpc>
+                <a:spcPct val="150000"/>
+              </a:lnSpc>
+              <a:buFont typeface="Wingdings" panose="05000000000000000000" pitchFamily="2" charset="2"/>
+              <a:buChar char="§"/>
+            </a:pPr>
+            <a:r>
+              <a:rPr lang="fr-FR" sz="2200" b="1" dirty="0" err="1"/>
+              <a:t>InnoDB</a:t>
+            </a:r>
+            <a:r>
+              <a:rPr lang="fr-FR" sz="2200" b="1" dirty="0"/>
+              <a:t> </a:t>
+            </a:r>
+            <a:r>
+              <a:rPr lang="fr-FR" sz="2200" b="1" dirty="0" err="1"/>
+              <a:t>redo</a:t>
+            </a:r>
+            <a:r>
+              <a:rPr lang="fr-FR" sz="2200" b="1" dirty="0"/>
+              <a:t> log </a:t>
+            </a:r>
+            <a:r>
+              <a:rPr lang="fr-FR" sz="2200" dirty="0"/>
+              <a:t>- </a:t>
+            </a:r>
+            <a:r>
+              <a:rPr lang="fr-FR" sz="2200" dirty="0" err="1"/>
+              <a:t>iblog</a:t>
+            </a:r>
+            <a:r>
+              <a:rPr lang="fr-FR" sz="2200" dirty="0"/>
+              <a:t>*</a:t>
+            </a:r>
+          </a:p>
+          <a:p>
+            <a:pPr>
+              <a:lnSpc>
+                <a:spcPct val="150000"/>
+              </a:lnSpc>
+            </a:pPr>
+            <a:endParaRPr lang="fr-FR" sz="2200" dirty="0"/>
+          </a:p>
+          <a:p>
+            <a:pPr marL="285750" indent="-285750">
+              <a:lnSpc>
+                <a:spcPct val="150000"/>
+              </a:lnSpc>
+              <a:buFont typeface="Wingdings" panose="05000000000000000000" pitchFamily="2" charset="2"/>
+              <a:buChar char="Ø"/>
+            </a:pPr>
+            <a:r>
+              <a:rPr lang="fr-FR" sz="1600" dirty="0"/>
+              <a:t>Voir les variables </a:t>
+            </a:r>
+            <a:r>
+              <a:rPr lang="fr-FR" sz="1600" b="1" dirty="0" err="1"/>
+              <a:t>basedir</a:t>
+            </a:r>
+            <a:r>
+              <a:rPr lang="fr-FR" sz="1600" dirty="0"/>
+              <a:t> et </a:t>
+            </a:r>
+            <a:r>
+              <a:rPr lang="fr-FR" sz="1600" b="1" dirty="0" err="1"/>
+              <a:t>datadir</a:t>
+            </a:r>
+            <a:r>
+              <a:rPr lang="fr-FR" sz="1600" dirty="0"/>
+              <a:t> pour l’emplacement par défaut de nombreux logs</a:t>
+            </a:r>
+          </a:p>
+          <a:p>
+            <a:pPr marL="285750" indent="-285750">
+              <a:lnSpc>
+                <a:spcPct val="150000"/>
+              </a:lnSpc>
+              <a:buFont typeface="Wingdings" panose="05000000000000000000" pitchFamily="2" charset="2"/>
+              <a:buChar char="Ø"/>
+            </a:pPr>
+            <a:r>
+              <a:rPr lang="fr-FR" sz="1600" dirty="0"/>
+              <a:t>Certains logs sont activés/désactivés par d’autres VARIABLES. Certains sont écrits dans un fichier ou dans une table.</a:t>
+            </a:r>
+          </a:p>
+        </p:txBody>
+      </p:sp>
+    </p:spTree>
+    <p:extLst>
+      <p:ext uri="{BB962C8B-B14F-4D97-AF65-F5344CB8AC3E}">
+        <p14:creationId xmlns:p14="http://schemas.microsoft.com/office/powerpoint/2010/main" val="2181765811"/>
+      </p:ext>
+    </p:extLst>
+  </p:cSld>
+  <p:clrMapOvr>
+    <a:masterClrMapping/>
+  </p:clrMapOvr>
+</p:sld>
+</file>
+
+<file path=ppt/slides/slide46.xml><?xml version="1.0" encoding="utf-8"?>
 <p:sld xmlns:a="http://schemas.openxmlformats.org/drawingml/2006/main" xmlns:r="http://schemas.openxmlformats.org/officeDocument/2006/relationships" xmlns:p="http://schemas.openxmlformats.org/presentationml/2006/main">
   <p:cSld>
     <p:spTree>

</xml_diff>